<commit_message>
corrections up into the probabilistic aspects
</commit_message>
<xml_diff>
--- a/img/timeline.pptx
+++ b/img/timeline.pptx
@@ -206,7 +206,7 @@
           <a:p>
             <a:fld id="{6B5248A3-7AFA-42A8-AC66-C1BC58F224A4}" type="datetimeFigureOut">
               <a:rPr lang="en-US" smtClean="0"/>
-              <a:t>3/16/2023</a:t>
+              <a:t>6/26/2023</a:t>
             </a:fld>
             <a:endParaRPr lang="en-US"/>
           </a:p>
@@ -796,7 +796,7 @@
           <a:p>
             <a:fld id="{E6166748-0AE2-4D20-A689-6CDC951126A8}" type="datetimeFigureOut">
               <a:rPr lang="en-DE" smtClean="0"/>
-              <a:t>16/03/2023</a:t>
+              <a:t>26/06/2023</a:t>
             </a:fld>
             <a:endParaRPr lang="en-DE"/>
           </a:p>
@@ -966,7 +966,7 @@
           <a:p>
             <a:fld id="{E6166748-0AE2-4D20-A689-6CDC951126A8}" type="datetimeFigureOut">
               <a:rPr lang="en-DE" smtClean="0"/>
-              <a:t>16/03/2023</a:t>
+              <a:t>26/06/2023</a:t>
             </a:fld>
             <a:endParaRPr lang="en-DE"/>
           </a:p>
@@ -1146,7 +1146,7 @@
           <a:p>
             <a:fld id="{E6166748-0AE2-4D20-A689-6CDC951126A8}" type="datetimeFigureOut">
               <a:rPr lang="en-DE" smtClean="0"/>
-              <a:t>16/03/2023</a:t>
+              <a:t>26/06/2023</a:t>
             </a:fld>
             <a:endParaRPr lang="en-DE"/>
           </a:p>
@@ -1316,7 +1316,7 @@
           <a:p>
             <a:fld id="{E6166748-0AE2-4D20-A689-6CDC951126A8}" type="datetimeFigureOut">
               <a:rPr lang="en-DE" smtClean="0"/>
-              <a:t>16/03/2023</a:t>
+              <a:t>26/06/2023</a:t>
             </a:fld>
             <a:endParaRPr lang="en-DE"/>
           </a:p>
@@ -1578,7 +1578,7 @@
           <a:p>
             <a:fld id="{E6166748-0AE2-4D20-A689-6CDC951126A8}" type="datetimeFigureOut">
               <a:rPr lang="en-DE" smtClean="0"/>
-              <a:t>16/03/2023</a:t>
+              <a:t>26/06/2023</a:t>
             </a:fld>
             <a:endParaRPr lang="en-DE"/>
           </a:p>
@@ -1810,7 +1810,7 @@
           <a:p>
             <a:fld id="{E6166748-0AE2-4D20-A689-6CDC951126A8}" type="datetimeFigureOut">
               <a:rPr lang="en-DE" smtClean="0"/>
-              <a:t>16/03/2023</a:t>
+              <a:t>26/06/2023</a:t>
             </a:fld>
             <a:endParaRPr lang="en-DE"/>
           </a:p>
@@ -2177,7 +2177,7 @@
           <a:p>
             <a:fld id="{E6166748-0AE2-4D20-A689-6CDC951126A8}" type="datetimeFigureOut">
               <a:rPr lang="en-DE" smtClean="0"/>
-              <a:t>16/03/2023</a:t>
+              <a:t>26/06/2023</a:t>
             </a:fld>
             <a:endParaRPr lang="en-DE"/>
           </a:p>
@@ -2295,7 +2295,7 @@
           <a:p>
             <a:fld id="{E6166748-0AE2-4D20-A689-6CDC951126A8}" type="datetimeFigureOut">
               <a:rPr lang="en-DE" smtClean="0"/>
-              <a:t>16/03/2023</a:t>
+              <a:t>26/06/2023</a:t>
             </a:fld>
             <a:endParaRPr lang="en-DE"/>
           </a:p>
@@ -2390,7 +2390,7 @@
           <a:p>
             <a:fld id="{E6166748-0AE2-4D20-A689-6CDC951126A8}" type="datetimeFigureOut">
               <a:rPr lang="en-DE" smtClean="0"/>
-              <a:t>16/03/2023</a:t>
+              <a:t>26/06/2023</a:t>
             </a:fld>
             <a:endParaRPr lang="en-DE"/>
           </a:p>
@@ -2667,7 +2667,7 @@
           <a:p>
             <a:fld id="{E6166748-0AE2-4D20-A689-6CDC951126A8}" type="datetimeFigureOut">
               <a:rPr lang="en-DE" smtClean="0"/>
-              <a:t>16/03/2023</a:t>
+              <a:t>26/06/2023</a:t>
             </a:fld>
             <a:endParaRPr lang="en-DE"/>
           </a:p>
@@ -2924,7 +2924,7 @@
           <a:p>
             <a:fld id="{E6166748-0AE2-4D20-A689-6CDC951126A8}" type="datetimeFigureOut">
               <a:rPr lang="en-DE" smtClean="0"/>
-              <a:t>16/03/2023</a:t>
+              <a:t>26/06/2023</a:t>
             </a:fld>
             <a:endParaRPr lang="en-DE"/>
           </a:p>
@@ -3137,7 +3137,7 @@
           <a:p>
             <a:fld id="{E6166748-0AE2-4D20-A689-6CDC951126A8}" type="datetimeFigureOut">
               <a:rPr lang="en-DE" smtClean="0"/>
-              <a:t>16/03/2023</a:t>
+              <a:t>26/06/2023</a:t>
             </a:fld>
             <a:endParaRPr lang="en-DE"/>
           </a:p>
@@ -4261,7 +4261,7 @@
                 <a:latin typeface="Times New Roman" panose="02020603050405020304" pitchFamily="18" charset="0"/>
                 <a:cs typeface="Times New Roman" panose="02020603050405020304" pitchFamily="18" charset="0"/>
               </a:rPr>
-              <a:t>FN or delayed TP?</a:t>
+              <a:t>FN and/or delayed TP?</a:t>
             </a:r>
           </a:p>
         </p:txBody>

</xml_diff>